<commit_message>
Update Viola · SlidesCarnival_DiaposBelen.pptx
</commit_message>
<xml_diff>
--- a/Defensa/Viola · SlidesCarnival_DiaposBelen.pptx
+++ b/Defensa/Viola · SlidesCarnival_DiaposBelen.pptx
@@ -18660,7 +18660,7 @@
         <p:spPr>
           <a:xfrm>
             <a:off x="1308847" y="1248022"/>
-            <a:ext cx="7161977" cy="2647456"/>
+            <a:ext cx="7161977" cy="3293787"/>
           </a:xfrm>
           <a:prstGeom prst="rect">
             <a:avLst/>
@@ -18741,6 +18741,39 @@
                 <a:latin typeface="Quattrocento Sans" panose="020B0604020202020204" charset="0"/>
               </a:rPr>
               <a:t>El mapeo del edificio juega un papel primordial.</a:t>
+            </a:r>
+          </a:p>
+          <a:p>
+            <a:pPr marL="285750" lvl="0" indent="-285750">
+              <a:lnSpc>
+                <a:spcPct val="150000"/>
+              </a:lnSpc>
+              <a:buClr>
+                <a:srgbClr val="CC95ED"/>
+              </a:buClr>
+              <a:buFont typeface="Arial" panose="020B0604020202020204" pitchFamily="34" charset="0"/>
+              <a:buChar char="•"/>
+            </a:pPr>
+            <a:endParaRPr lang="es-ES" dirty="0">
+              <a:latin typeface="Quattrocento Sans" panose="020B0604020202020204" charset="0"/>
+            </a:endParaRPr>
+          </a:p>
+          <a:p>
+            <a:pPr marL="285750" lvl="0" indent="-285750">
+              <a:lnSpc>
+                <a:spcPct val="150000"/>
+              </a:lnSpc>
+              <a:buClr>
+                <a:srgbClr val="CC95ED"/>
+              </a:buClr>
+              <a:buFont typeface="Arial" panose="020B0604020202020204" pitchFamily="34" charset="0"/>
+              <a:buChar char="•"/>
+            </a:pPr>
+            <a:r>
+              <a:rPr lang="es-ES" dirty="0">
+                <a:latin typeface="Quattrocento Sans" panose="020B0604020202020204" charset="0"/>
+              </a:rPr>
+              <a:t>Instrucciones e información anticipada reducen la sensación de desorientación.</a:t>
             </a:r>
           </a:p>
           <a:p>

</xml_diff>

<commit_message>
Pruebas para el vídeo
</commit_message>
<xml_diff>
--- a/Defensa/Viola · SlidesCarnival_DiaposBelen.pptx
+++ b/Defensa/Viola · SlidesCarnival_DiaposBelen.pptx
@@ -3792,7 +3792,7 @@
   <dgm:whole/>
   <dgm:extLst>
     <a:ext uri="http://schemas.microsoft.com/office/drawing/2008/diagram">
-      <dsp:dataModelExt xmlns:dsp="http://schemas.microsoft.com/office/drawing/2008/diagram" relId="rId7" minVer="http://schemas.openxmlformats.org/drawingml/2006/diagram"/>
+      <dsp:dataModelExt xmlns:dsp="http://schemas.microsoft.com/office/drawing/2008/diagram" relId="rId10" minVer="http://schemas.openxmlformats.org/drawingml/2006/diagram"/>
     </a:ext>
   </dgm:extLst>
 </dgm:dataModel>
@@ -17031,7 +17031,7 @@
         </p:xfrm>
         <a:graphic>
           <a:graphicData uri="http://schemas.openxmlformats.org/drawingml/2006/diagram">
-            <dgm:relIds xmlns:dgm="http://schemas.openxmlformats.org/drawingml/2006/diagram" xmlns:r="http://schemas.openxmlformats.org/officeDocument/2006/relationships" r:dm="rId3" r:lo="rId4" r:qs="rId5" r:cs="rId6"/>
+            <dgm:relIds xmlns:dgm="http://schemas.openxmlformats.org/drawingml/2006/diagram" xmlns:r="http://schemas.openxmlformats.org/officeDocument/2006/relationships" r:dm="rId6" r:lo="rId7" r:qs="rId8" r:cs="rId9"/>
           </a:graphicData>
         </a:graphic>
       </p:graphicFrame>
@@ -17554,7 +17554,48 @@
           </a:p>
         </p:txBody>
       </p:sp>
+      <p:pic>
+        <p:nvPicPr>
+          <p:cNvPr id="4" name="Audio 3">
+            <a:hlinkClick r:id="" action="ppaction://media"/>
+            <a:extLst>
+              <a:ext uri="{FF2B5EF4-FFF2-40B4-BE49-F238E27FC236}">
+                <a16:creationId xmlns:a16="http://schemas.microsoft.com/office/drawing/2014/main" id="{C4E2B348-1865-44E8-A333-643CA436BF1B}"/>
+              </a:ext>
+            </a:extLst>
+          </p:cNvPr>
+          <p:cNvPicPr>
+            <a:picLocks noChangeAspect="1"/>
+          </p:cNvPicPr>
+          <p:nvPr>
+            <a:audioFile r:link="rId3"/>
+            <p:extLst>
+              <p:ext uri="{DAA4B4D4-6D71-4841-9C94-3DE7FCFB9230}">
+                <p14:media xmlns:p14="http://schemas.microsoft.com/office/powerpoint/2010/main" r:embed="rId2"/>
+              </p:ext>
+            </p:extLst>
+          </p:nvPr>
+        </p:nvPicPr>
+        <p:blipFill>
+          <a:blip r:embed="rId11"/>
+          <a:stretch>
+            <a:fillRect/>
+          </a:stretch>
+        </p:blipFill>
+        <p:spPr>
+          <a:xfrm>
+            <a:off x="8318500" y="4318000"/>
+            <a:ext cx="609600" cy="609600"/>
+          </a:xfrm>
+          <a:prstGeom prst="rect">
+            <a:avLst/>
+          </a:prstGeom>
+        </p:spPr>
+      </p:pic>
     </p:spTree>
+    <p:custDataLst>
+      <p:tags r:id="rId1"/>
+    </p:custDataLst>
     <p:extLst>
       <p:ext uri="{BB962C8B-B14F-4D97-AF65-F5344CB8AC3E}">
         <p14:creationId xmlns:p14="http://schemas.microsoft.com/office/powerpoint/2010/main" val="845222504"/>
@@ -17564,6 +17605,9 @@
   <p:clrMapOvr>
     <a:masterClrMapping/>
   </p:clrMapOvr>
+  <p:transition advTm="8374">
+    <p:fade thruBlk="1"/>
+  </p:transition>
   <p:timing>
     <p:tnLst>
       <p:par>
@@ -17576,6 +17620,9 @@
                     <p:cTn id="3" fill="hold">
                       <p:stCondLst>
                         <p:cond delay="indefinite"/>
+                        <p:cond evt="onBegin" delay="0">
+                          <p:tn val="2"/>
+                        </p:cond>
                       </p:stCondLst>
                       <p:childTnLst>
                         <p:par>
@@ -17585,14 +17632,49 @@
                             </p:stCondLst>
                             <p:childTnLst>
                               <p:par>
-                                <p:cTn id="5" presetID="10" presetClass="entr" presetSubtype="0" fill="hold" grpId="0" nodeType="clickEffect">
+                                <p:cTn id="5" presetID="1" presetClass="mediacall" presetSubtype="0" fill="hold" nodeType="afterEffect">
+                                  <p:stCondLst>
+                                    <p:cond delay="0"/>
+                                  </p:stCondLst>
+                                  <p:childTnLst>
+                                    <p:cmd type="call" cmd="playFrom(0.0)">
+                                      <p:cBhvr>
+                                        <p:cTn id="6" dur="1" fill="hold"/>
+                                        <p:tgtEl>
+                                          <p:spTgt spid="4"/>
+                                        </p:tgtEl>
+                                      </p:cBhvr>
+                                    </p:cmd>
+                                  </p:childTnLst>
+                                </p:cTn>
+                              </p:par>
+                            </p:childTnLst>
+                          </p:cTn>
+                        </p:par>
+                      </p:childTnLst>
+                    </p:cTn>
+                  </p:par>
+                  <p:par>
+                    <p:cTn id="7" fill="hold">
+                      <p:stCondLst>
+                        <p:cond delay="indefinite"/>
+                      </p:stCondLst>
+                      <p:childTnLst>
+                        <p:par>
+                          <p:cTn id="8" fill="hold">
+                            <p:stCondLst>
+                              <p:cond delay="0"/>
+                            </p:stCondLst>
+                            <p:childTnLst>
+                              <p:par>
+                                <p:cTn id="9" presetID="10" presetClass="entr" presetSubtype="0" fill="hold" grpId="0" nodeType="clickEffect">
                                   <p:stCondLst>
                                     <p:cond delay="0"/>
                                   </p:stCondLst>
                                   <p:childTnLst>
                                     <p:set>
                                       <p:cBhvr>
-                                        <p:cTn id="6" dur="1" fill="hold">
+                                        <p:cTn id="10" dur="1" fill="hold">
                                           <p:stCondLst>
                                             <p:cond delay="0"/>
                                           </p:stCondLst>
@@ -17610,7 +17692,7 @@
                                     </p:set>
                                     <p:animEffect transition="in" filter="fade">
                                       <p:cBhvr>
-                                        <p:cTn id="7" dur="500"/>
+                                        <p:cTn id="11" dur="500"/>
                                         <p:tgtEl>
                                           <p:spTgt spid="6"/>
                                         </p:tgtEl>
@@ -17626,26 +17708,26 @@
                     </p:cTn>
                   </p:par>
                   <p:par>
-                    <p:cTn id="8" fill="hold">
+                    <p:cTn id="12" fill="hold">
                       <p:stCondLst>
                         <p:cond delay="indefinite"/>
                       </p:stCondLst>
                       <p:childTnLst>
                         <p:par>
-                          <p:cTn id="9" fill="hold">
+                          <p:cTn id="13" fill="hold">
                             <p:stCondLst>
                               <p:cond delay="0"/>
                             </p:stCondLst>
                             <p:childTnLst>
                               <p:par>
-                                <p:cTn id="10" presetID="10" presetClass="entr" presetSubtype="0" fill="hold" grpId="0" nodeType="clickEffect">
+                                <p:cTn id="14" presetID="10" presetClass="entr" presetSubtype="0" fill="hold" grpId="0" nodeType="clickEffect">
                                   <p:stCondLst>
                                     <p:cond delay="0"/>
                                   </p:stCondLst>
                                   <p:childTnLst>
                                     <p:set>
                                       <p:cBhvr>
-                                        <p:cTn id="11" dur="1" fill="hold">
+                                        <p:cTn id="15" dur="1" fill="hold">
                                           <p:stCondLst>
                                             <p:cond delay="0"/>
                                           </p:stCondLst>
@@ -17667,7 +17749,7 @@
                                     </p:set>
                                     <p:animEffect transition="in" filter="fade">
                                       <p:cBhvr>
-                                        <p:cTn id="12" dur="500"/>
+                                        <p:cTn id="16" dur="500"/>
                                         <p:tgtEl>
                                           <p:spTgt spid="2">
                                             <p:graphicEl>
@@ -17687,26 +17769,26 @@
                     </p:cTn>
                   </p:par>
                   <p:par>
-                    <p:cTn id="13" fill="hold">
+                    <p:cTn id="17" fill="hold">
                       <p:stCondLst>
                         <p:cond delay="indefinite"/>
                       </p:stCondLst>
                       <p:childTnLst>
                         <p:par>
-                          <p:cTn id="14" fill="hold">
+                          <p:cTn id="18" fill="hold">
                             <p:stCondLst>
                               <p:cond delay="0"/>
                             </p:stCondLst>
                             <p:childTnLst>
                               <p:par>
-                                <p:cTn id="15" presetID="10" presetClass="entr" presetSubtype="0" fill="hold" grpId="0" nodeType="clickEffect">
+                                <p:cTn id="19" presetID="10" presetClass="entr" presetSubtype="0" fill="hold" grpId="0" nodeType="clickEffect">
                                   <p:stCondLst>
                                     <p:cond delay="0"/>
                                   </p:stCondLst>
                                   <p:childTnLst>
                                     <p:set>
                                       <p:cBhvr>
-                                        <p:cTn id="16" dur="1" fill="hold">
+                                        <p:cTn id="20" dur="1" fill="hold">
                                           <p:stCondLst>
                                             <p:cond delay="0"/>
                                           </p:stCondLst>
@@ -17724,7 +17806,7 @@
                                     </p:set>
                                     <p:animEffect transition="in" filter="fade">
                                       <p:cBhvr>
-                                        <p:cTn id="17" dur="500"/>
+                                        <p:cTn id="21" dur="500"/>
                                         <p:tgtEl>
                                           <p:spTgt spid="8"/>
                                         </p:tgtEl>
@@ -17740,26 +17822,26 @@
                     </p:cTn>
                   </p:par>
                   <p:par>
-                    <p:cTn id="18" fill="hold">
+                    <p:cTn id="22" fill="hold">
                       <p:stCondLst>
                         <p:cond delay="indefinite"/>
                       </p:stCondLst>
                       <p:childTnLst>
                         <p:par>
-                          <p:cTn id="19" fill="hold">
+                          <p:cTn id="23" fill="hold">
                             <p:stCondLst>
                               <p:cond delay="0"/>
                             </p:stCondLst>
                             <p:childTnLst>
                               <p:par>
-                                <p:cTn id="20" presetID="10" presetClass="entr" presetSubtype="0" fill="hold" grpId="0" nodeType="clickEffect">
+                                <p:cTn id="24" presetID="10" presetClass="entr" presetSubtype="0" fill="hold" grpId="0" nodeType="clickEffect">
                                   <p:stCondLst>
                                     <p:cond delay="0"/>
                                   </p:stCondLst>
                                   <p:childTnLst>
                                     <p:set>
                                       <p:cBhvr>
-                                        <p:cTn id="21" dur="1" fill="hold">
+                                        <p:cTn id="25" dur="1" fill="hold">
                                           <p:stCondLst>
                                             <p:cond delay="0"/>
                                           </p:stCondLst>
@@ -17781,7 +17863,7 @@
                                     </p:set>
                                     <p:animEffect transition="in" filter="fade">
                                       <p:cBhvr>
-                                        <p:cTn id="22" dur="500"/>
+                                        <p:cTn id="26" dur="500"/>
                                         <p:tgtEl>
                                           <p:spTgt spid="2">
                                             <p:graphicEl>
@@ -17801,26 +17883,26 @@
                     </p:cTn>
                   </p:par>
                   <p:par>
-                    <p:cTn id="23" fill="hold">
+                    <p:cTn id="27" fill="hold">
                       <p:stCondLst>
                         <p:cond delay="indefinite"/>
                       </p:stCondLst>
                       <p:childTnLst>
                         <p:par>
-                          <p:cTn id="24" fill="hold">
+                          <p:cTn id="28" fill="hold">
                             <p:stCondLst>
                               <p:cond delay="0"/>
                             </p:stCondLst>
                             <p:childTnLst>
                               <p:par>
-                                <p:cTn id="25" presetID="10" presetClass="entr" presetSubtype="0" fill="hold" grpId="0" nodeType="clickEffect">
+                                <p:cTn id="29" presetID="10" presetClass="entr" presetSubtype="0" fill="hold" grpId="0" nodeType="clickEffect">
                                   <p:stCondLst>
                                     <p:cond delay="0"/>
                                   </p:stCondLst>
                                   <p:childTnLst>
                                     <p:set>
                                       <p:cBhvr>
-                                        <p:cTn id="26" dur="1" fill="hold">
+                                        <p:cTn id="30" dur="1" fill="hold">
                                           <p:stCondLst>
                                             <p:cond delay="0"/>
                                           </p:stCondLst>
@@ -17838,7 +17920,7 @@
                                     </p:set>
                                     <p:animEffect transition="in" filter="fade">
                                       <p:cBhvr>
-                                        <p:cTn id="27" dur="500"/>
+                                        <p:cTn id="31" dur="500"/>
                                         <p:tgtEl>
                                           <p:spTgt spid="9"/>
                                         </p:tgtEl>
@@ -17854,26 +17936,26 @@
                     </p:cTn>
                   </p:par>
                   <p:par>
-                    <p:cTn id="28" fill="hold">
+                    <p:cTn id="32" fill="hold">
                       <p:stCondLst>
                         <p:cond delay="indefinite"/>
                       </p:stCondLst>
                       <p:childTnLst>
                         <p:par>
-                          <p:cTn id="29" fill="hold">
+                          <p:cTn id="33" fill="hold">
                             <p:stCondLst>
                               <p:cond delay="0"/>
                             </p:stCondLst>
                             <p:childTnLst>
                               <p:par>
-                                <p:cTn id="30" presetID="10" presetClass="entr" presetSubtype="0" fill="hold" grpId="0" nodeType="clickEffect">
+                                <p:cTn id="34" presetID="10" presetClass="entr" presetSubtype="0" fill="hold" grpId="0" nodeType="clickEffect">
                                   <p:stCondLst>
                                     <p:cond delay="0"/>
                                   </p:stCondLst>
                                   <p:childTnLst>
                                     <p:set>
                                       <p:cBhvr>
-                                        <p:cTn id="31" dur="1" fill="hold">
+                                        <p:cTn id="35" dur="1" fill="hold">
                                           <p:stCondLst>
                                             <p:cond delay="0"/>
                                           </p:stCondLst>
@@ -17895,7 +17977,7 @@
                                     </p:set>
                                     <p:animEffect transition="in" filter="fade">
                                       <p:cBhvr>
-                                        <p:cTn id="32" dur="500"/>
+                                        <p:cTn id="36" dur="500"/>
                                         <p:tgtEl>
                                           <p:spTgt spid="2">
                                             <p:graphicEl>
@@ -17915,26 +17997,26 @@
                     </p:cTn>
                   </p:par>
                   <p:par>
-                    <p:cTn id="33" fill="hold">
+                    <p:cTn id="37" fill="hold">
                       <p:stCondLst>
                         <p:cond delay="indefinite"/>
                       </p:stCondLst>
                       <p:childTnLst>
                         <p:par>
-                          <p:cTn id="34" fill="hold">
+                          <p:cTn id="38" fill="hold">
                             <p:stCondLst>
                               <p:cond delay="0"/>
                             </p:stCondLst>
                             <p:childTnLst>
                               <p:par>
-                                <p:cTn id="35" presetID="10" presetClass="entr" presetSubtype="0" fill="hold" grpId="0" nodeType="clickEffect">
+                                <p:cTn id="39" presetID="10" presetClass="entr" presetSubtype="0" fill="hold" grpId="0" nodeType="clickEffect">
                                   <p:stCondLst>
                                     <p:cond delay="0"/>
                                   </p:stCondLst>
                                   <p:childTnLst>
                                     <p:set>
                                       <p:cBhvr>
-                                        <p:cTn id="36" dur="1" fill="hold">
+                                        <p:cTn id="40" dur="1" fill="hold">
                                           <p:stCondLst>
                                             <p:cond delay="0"/>
                                           </p:stCondLst>
@@ -17952,7 +18034,7 @@
                                     </p:set>
                                     <p:animEffect transition="in" filter="fade">
                                       <p:cBhvr>
-                                        <p:cTn id="37" dur="500"/>
+                                        <p:cTn id="41" dur="500"/>
                                         <p:tgtEl>
                                           <p:spTgt spid="14"/>
                                         </p:tgtEl>
@@ -17968,26 +18050,26 @@
                     </p:cTn>
                   </p:par>
                   <p:par>
-                    <p:cTn id="38" fill="hold">
+                    <p:cTn id="42" fill="hold">
                       <p:stCondLst>
                         <p:cond delay="indefinite"/>
                       </p:stCondLst>
                       <p:childTnLst>
                         <p:par>
-                          <p:cTn id="39" fill="hold">
+                          <p:cTn id="43" fill="hold">
                             <p:stCondLst>
                               <p:cond delay="0"/>
                             </p:stCondLst>
                             <p:childTnLst>
                               <p:par>
-                                <p:cTn id="40" presetID="10" presetClass="entr" presetSubtype="0" fill="hold" grpId="0" nodeType="clickEffect">
+                                <p:cTn id="44" presetID="10" presetClass="entr" presetSubtype="0" fill="hold" grpId="0" nodeType="clickEffect">
                                   <p:stCondLst>
                                     <p:cond delay="0"/>
                                   </p:stCondLst>
                                   <p:childTnLst>
                                     <p:set>
                                       <p:cBhvr>
-                                        <p:cTn id="41" dur="1" fill="hold">
+                                        <p:cTn id="45" dur="1" fill="hold">
                                           <p:stCondLst>
                                             <p:cond delay="0"/>
                                           </p:stCondLst>
@@ -18009,7 +18091,7 @@
                                     </p:set>
                                     <p:animEffect transition="in" filter="fade">
                                       <p:cBhvr>
-                                        <p:cTn id="42" dur="500"/>
+                                        <p:cTn id="46" dur="500"/>
                                         <p:tgtEl>
                                           <p:spTgt spid="2">
                                             <p:graphicEl>
@@ -18029,26 +18111,26 @@
                     </p:cTn>
                   </p:par>
                   <p:par>
-                    <p:cTn id="43" fill="hold">
+                    <p:cTn id="47" fill="hold">
                       <p:stCondLst>
                         <p:cond delay="indefinite"/>
                       </p:stCondLst>
                       <p:childTnLst>
                         <p:par>
-                          <p:cTn id="44" fill="hold">
+                          <p:cTn id="48" fill="hold">
                             <p:stCondLst>
                               <p:cond delay="0"/>
                             </p:stCondLst>
                             <p:childTnLst>
                               <p:par>
-                                <p:cTn id="45" presetID="10" presetClass="entr" presetSubtype="0" fill="hold" grpId="0" nodeType="clickEffect">
+                                <p:cTn id="49" presetID="10" presetClass="entr" presetSubtype="0" fill="hold" grpId="0" nodeType="clickEffect">
                                   <p:stCondLst>
                                     <p:cond delay="0"/>
                                   </p:stCondLst>
                                   <p:childTnLst>
                                     <p:set>
                                       <p:cBhvr>
-                                        <p:cTn id="46" dur="1" fill="hold">
+                                        <p:cTn id="50" dur="1" fill="hold">
                                           <p:stCondLst>
                                             <p:cond delay="0"/>
                                           </p:stCondLst>
@@ -18066,7 +18148,7 @@
                                     </p:set>
                                     <p:animEffect transition="in" filter="fade">
                                       <p:cBhvr>
-                                        <p:cTn id="47" dur="500"/>
+                                        <p:cTn id="51" dur="500"/>
                                         <p:tgtEl>
                                           <p:spTgt spid="15"/>
                                         </p:tgtEl>
@@ -18098,6 +18180,25 @@
                 </p:cond>
               </p:nextCondLst>
             </p:seq>
+            <p:audio isNarration="1">
+              <p:cMediaNode vol="80000" showWhenStopped="0">
+                <p:cTn id="52" fill="hold" display="0">
+                  <p:stCondLst>
+                    <p:cond delay="indefinite"/>
+                  </p:stCondLst>
+                  <p:endCondLst>
+                    <p:cond evt="onStopAudio" delay="0">
+                      <p:tgtEl>
+                        <p:sldTgt/>
+                      </p:tgtEl>
+                    </p:cond>
+                  </p:endCondLst>
+                </p:cTn>
+                <p:tgtEl>
+                  <p:spTgt spid="4"/>
+                </p:tgtEl>
+              </p:cMediaNode>
+            </p:audio>
           </p:childTnLst>
         </p:cTn>
       </p:par>
@@ -33291,6 +33392,12 @@
 </p:sld>
 </file>
 
+<file path=ppt/tags/tag1.xml><?xml version="1.0" encoding="utf-8"?>
+<p:tagLst xmlns:a="http://schemas.openxmlformats.org/drawingml/2006/main" xmlns:r="http://schemas.openxmlformats.org/officeDocument/2006/relationships" xmlns:p="http://schemas.openxmlformats.org/presentationml/2006/main">
+  <p:tag name="TIMING" val="|0.8|0.9|0.7|0.6|0.5|0.7|0.5|0.6|0.6"/>
+</p:tagLst>
+</file>
+
 <file path=ppt/theme/theme1.xml><?xml version="1.0" encoding="utf-8"?>
 <a:theme xmlns:a="http://schemas.openxmlformats.org/drawingml/2006/main" name="Viola template">
   <a:themeElements>

</xml_diff>